<commit_message>
changes to UML diagram
</commit_message>
<xml_diff>
--- a/docs/Presentation_v0.pptx
+++ b/docs/Presentation_v0.pptx
@@ -9034,10 +9034,10 @@
       </p:sp>
       <p:pic>
         <p:nvPicPr>
-          <p:cNvPr id="8" name="Picture 7" descr="Diagram, schematic&#10;&#10;Description automatically generated">
-            <a:extLst>
-              <a:ext uri="{FF2B5EF4-FFF2-40B4-BE49-F238E27FC236}">
-                <a16:creationId xmlns:a16="http://schemas.microsoft.com/office/drawing/2014/main" id="{128DECBD-D3C0-A44F-A9B9-3CD6B0272450}"/>
+          <p:cNvPr id="5" name="תמונה 4" descr="תמונה שמכילה תרשים, סכמטי&#10;&#10;התיאור נוצר באופן אוטומטי">
+            <a:extLst>
+              <a:ext uri="{FF2B5EF4-FFF2-40B4-BE49-F238E27FC236}">
+                <a16:creationId xmlns:a16="http://schemas.microsoft.com/office/drawing/2014/main" id="{1D4E8B05-CFA2-4222-970A-B30916757CFF}"/>
               </a:ext>
             </a:extLst>
           </p:cNvPr>
@@ -9060,8 +9060,8 @@
         </p:blipFill>
         <p:spPr>
           <a:xfrm>
-            <a:off x="2157982" y="1639646"/>
-            <a:ext cx="7876035" cy="5158802"/>
+            <a:off x="2256605" y="1602644"/>
+            <a:ext cx="7629605" cy="5007318"/>
           </a:xfrm>
           <a:prstGeom prst="rect">
             <a:avLst/>

</xml_diff>